<commit_message>
Delete unused jsp (DeleteStudentByID.jsp + DeleteTutor.jsp) Delete unnecessary comments for Retrieve_Update_StudentServlet.java & DeleteStudentServlet.java Change Student ID/Tutor ID to NRIC in CreateNewStudent.jsp & CreateTutor.jsp Update Wiki Template
</commit_message>
<xml_diff>
--- a/wiki/Wiki Template.pptx
+++ b/wiki/Wiki Template.pptx
@@ -5434,8 +5434,8 @@
         </p:nvSpPr>
         <p:spPr>
           <a:xfrm>
-            <a:off x="1811416" y="3716117"/>
-            <a:ext cx="734217" cy="1708160"/>
+            <a:off x="1811417" y="3716117"/>
+            <a:ext cx="693282" cy="1785104"/>
           </a:xfrm>
           <a:prstGeom prst="rect">
             <a:avLst/>
@@ -5771,7 +5771,7 @@
         <p:spPr>
           <a:xfrm>
             <a:off x="2309350" y="3527786"/>
-            <a:ext cx="671668" cy="707886"/>
+            <a:ext cx="671668" cy="1169551"/>
           </a:xfrm>
           <a:prstGeom prst="rect">
             <a:avLst/>
@@ -5845,6 +5845,44 @@
               </a:rPr>
               <a:t>- Updating Schedule</a:t>
             </a:r>
+          </a:p>
+          <a:p>
+            <a:r>
+              <a:rPr lang="en-US" sz="500" b="1" dirty="0">
+                <a:solidFill>
+                  <a:schemeClr val="bg2"/>
+                </a:solidFill>
+                <a:latin typeface="Maiandra GD" panose="020E0502030308020204" pitchFamily="34" charset="0"/>
+              </a:rPr>
+              <a:t>- Push Notification for Tutors before Classes using </a:t>
+            </a:r>
+            <a:r>
+              <a:rPr lang="en-US" sz="500" b="1" dirty="0" err="1">
+                <a:solidFill>
+                  <a:schemeClr val="bg2"/>
+                </a:solidFill>
+                <a:latin typeface="Maiandra GD" panose="020E0502030308020204" pitchFamily="34" charset="0"/>
+              </a:rPr>
+              <a:t>OneSignal</a:t>
+            </a:r>
+            <a:endParaRPr lang="en-US" sz="500" b="1" dirty="0">
+              <a:solidFill>
+                <a:schemeClr val="bg2"/>
+              </a:solidFill>
+              <a:latin typeface="Maiandra GD" panose="020E0502030308020204" pitchFamily="34" charset="0"/>
+            </a:endParaRPr>
+          </a:p>
+          <a:p>
+            <a:pPr marL="171450" indent="-171450">
+              <a:buFontTx/>
+              <a:buChar char="-"/>
+            </a:pPr>
+            <a:endParaRPr lang="en-US" sz="500" b="1" dirty="0">
+              <a:solidFill>
+                <a:schemeClr val="bg2"/>
+              </a:solidFill>
+              <a:latin typeface="Maiandra GD" panose="020E0502030308020204" pitchFamily="34" charset="0"/>
+            </a:endParaRPr>
           </a:p>
           <a:p>
             <a:endParaRPr lang="en-US" sz="500" b="1" dirty="0">
@@ -6032,7 +6070,7 @@
         <p:spPr>
           <a:xfrm>
             <a:off x="2830348" y="3804835"/>
-            <a:ext cx="659270" cy="1246495"/>
+            <a:ext cx="659270" cy="630942"/>
           </a:xfrm>
           <a:prstGeom prst="rect">
             <a:avLst/>
@@ -6044,62 +6082,6 @@
             <a:spAutoFit/>
           </a:bodyPr>
           <a:lstStyle/>
-          <a:p>
-            <a:r>
-              <a:rPr lang="en-US" sz="500" b="1" u="sng" dirty="0">
-                <a:solidFill>
-                  <a:schemeClr val="bg2"/>
-                </a:solidFill>
-                <a:latin typeface="Maiandra GD" panose="020E0502030308020204" pitchFamily="34" charset="0"/>
-              </a:rPr>
-              <a:t>Schedule Module </a:t>
-            </a:r>
-          </a:p>
-          <a:p>
-            <a:r>
-              <a:rPr lang="en-US" sz="500" b="1" dirty="0">
-                <a:solidFill>
-                  <a:schemeClr val="bg2"/>
-                </a:solidFill>
-                <a:latin typeface="Maiandra GD" panose="020E0502030308020204" pitchFamily="34" charset="0"/>
-              </a:rPr>
-              <a:t>- View Schedule</a:t>
-            </a:r>
-          </a:p>
-          <a:p>
-            <a:r>
-              <a:rPr lang="en-US" sz="500" b="1" dirty="0">
-                <a:solidFill>
-                  <a:schemeClr val="bg2"/>
-                </a:solidFill>
-                <a:latin typeface="Maiandra GD" panose="020E0502030308020204" pitchFamily="34" charset="0"/>
-              </a:rPr>
-              <a:t>- Push Notification for Tutors before Classes using </a:t>
-            </a:r>
-            <a:r>
-              <a:rPr lang="en-US" sz="500" b="1" dirty="0" err="1">
-                <a:solidFill>
-                  <a:schemeClr val="bg2"/>
-                </a:solidFill>
-                <a:latin typeface="Maiandra GD" panose="020E0502030308020204" pitchFamily="34" charset="0"/>
-              </a:rPr>
-              <a:t>OneSignal</a:t>
-            </a:r>
-            <a:endParaRPr lang="en-US" sz="500" b="1" dirty="0">
-              <a:solidFill>
-                <a:schemeClr val="bg2"/>
-              </a:solidFill>
-              <a:latin typeface="Maiandra GD" panose="020E0502030308020204" pitchFamily="34" charset="0"/>
-            </a:endParaRPr>
-          </a:p>
-          <a:p>
-            <a:endParaRPr lang="en-US" sz="500" b="1" dirty="0">
-              <a:solidFill>
-                <a:schemeClr val="bg2"/>
-              </a:solidFill>
-              <a:latin typeface="Maiandra GD" panose="020E0502030308020204" pitchFamily="34" charset="0"/>
-            </a:endParaRPr>
-          </a:p>
           <a:p>
             <a:r>
               <a:rPr lang="en-US" sz="500" b="1" u="sng" dirty="0">

</xml_diff>

<commit_message>
Updated Wiki Template.pptx according to Prof Feedback
</commit_message>
<xml_diff>
--- a/wiki/Wiki Template.pptx
+++ b/wiki/Wiki Template.pptx
@@ -253,7 +253,7 @@
           <a:p>
             <a:fld id="{A5C1DC53-9CC5-458A-B04C-4467225BFBE6}" type="datetimeFigureOut">
               <a:rPr lang="en-US" smtClean="0"/>
-              <a:t>8/3/18</a:t>
+              <a:t>8/6/2018</a:t>
             </a:fld>
             <a:endParaRPr lang="en-US"/>
           </a:p>
@@ -423,7 +423,7 @@
           <a:p>
             <a:fld id="{A5C1DC53-9CC5-458A-B04C-4467225BFBE6}" type="datetimeFigureOut">
               <a:rPr lang="en-US" smtClean="0"/>
-              <a:t>8/3/18</a:t>
+              <a:t>8/6/2018</a:t>
             </a:fld>
             <a:endParaRPr lang="en-US"/>
           </a:p>
@@ -603,7 +603,7 @@
           <a:p>
             <a:fld id="{A5C1DC53-9CC5-458A-B04C-4467225BFBE6}" type="datetimeFigureOut">
               <a:rPr lang="en-US" smtClean="0"/>
-              <a:t>8/3/18</a:t>
+              <a:t>8/6/2018</a:t>
             </a:fld>
             <a:endParaRPr lang="en-US"/>
           </a:p>
@@ -773,7 +773,7 @@
           <a:p>
             <a:fld id="{A5C1DC53-9CC5-458A-B04C-4467225BFBE6}" type="datetimeFigureOut">
               <a:rPr lang="en-US" smtClean="0"/>
-              <a:t>8/3/18</a:t>
+              <a:t>8/6/2018</a:t>
             </a:fld>
             <a:endParaRPr lang="en-US"/>
           </a:p>
@@ -1017,7 +1017,7 @@
           <a:p>
             <a:fld id="{A5C1DC53-9CC5-458A-B04C-4467225BFBE6}" type="datetimeFigureOut">
               <a:rPr lang="en-US" smtClean="0"/>
-              <a:t>8/3/18</a:t>
+              <a:t>8/6/2018</a:t>
             </a:fld>
             <a:endParaRPr lang="en-US"/>
           </a:p>
@@ -1249,7 +1249,7 @@
           <a:p>
             <a:fld id="{A5C1DC53-9CC5-458A-B04C-4467225BFBE6}" type="datetimeFigureOut">
               <a:rPr lang="en-US" smtClean="0"/>
-              <a:t>8/3/18</a:t>
+              <a:t>8/6/2018</a:t>
             </a:fld>
             <a:endParaRPr lang="en-US"/>
           </a:p>
@@ -1616,7 +1616,7 @@
           <a:p>
             <a:fld id="{A5C1DC53-9CC5-458A-B04C-4467225BFBE6}" type="datetimeFigureOut">
               <a:rPr lang="en-US" smtClean="0"/>
-              <a:t>8/3/18</a:t>
+              <a:t>8/6/2018</a:t>
             </a:fld>
             <a:endParaRPr lang="en-US"/>
           </a:p>
@@ -1734,7 +1734,7 @@
           <a:p>
             <a:fld id="{A5C1DC53-9CC5-458A-B04C-4467225BFBE6}" type="datetimeFigureOut">
               <a:rPr lang="en-US" smtClean="0"/>
-              <a:t>8/3/18</a:t>
+              <a:t>8/6/2018</a:t>
             </a:fld>
             <a:endParaRPr lang="en-US"/>
           </a:p>
@@ -1829,7 +1829,7 @@
           <a:p>
             <a:fld id="{A5C1DC53-9CC5-458A-B04C-4467225BFBE6}" type="datetimeFigureOut">
               <a:rPr lang="en-US" smtClean="0"/>
-              <a:t>8/3/18</a:t>
+              <a:t>8/6/2018</a:t>
             </a:fld>
             <a:endParaRPr lang="en-US"/>
           </a:p>
@@ -2106,7 +2106,7 @@
           <a:p>
             <a:fld id="{A5C1DC53-9CC5-458A-B04C-4467225BFBE6}" type="datetimeFigureOut">
               <a:rPr lang="en-US" smtClean="0"/>
-              <a:t>8/3/18</a:t>
+              <a:t>8/6/2018</a:t>
             </a:fld>
             <a:endParaRPr lang="en-US"/>
           </a:p>
@@ -2363,7 +2363,7 @@
           <a:p>
             <a:fld id="{A5C1DC53-9CC5-458A-B04C-4467225BFBE6}" type="datetimeFigureOut">
               <a:rPr lang="en-US" smtClean="0"/>
-              <a:t>8/3/18</a:t>
+              <a:t>8/6/2018</a:t>
             </a:fld>
             <a:endParaRPr lang="en-US"/>
           </a:p>
@@ -2576,7 +2576,7 @@
           <a:p>
             <a:fld id="{A5C1DC53-9CC5-458A-B04C-4467225BFBE6}" type="datetimeFigureOut">
               <a:rPr lang="en-US" smtClean="0"/>
-              <a:t>8/3/18</a:t>
+              <a:t>8/6/2018</a:t>
             </a:fld>
             <a:endParaRPr lang="en-US"/>
           </a:p>
@@ -15380,7 +15380,7 @@
         <p:spPr>
           <a:xfrm>
             <a:off x="3643467" y="1318034"/>
-            <a:ext cx="1104540" cy="461665"/>
+            <a:ext cx="1104540" cy="1846659"/>
           </a:xfrm>
           <a:prstGeom prst="rect">
             <a:avLst/>
@@ -15423,6 +15423,122 @@
               </a:rPr>
               <a:t>Invoice Generation</a:t>
             </a:r>
+          </a:p>
+          <a:p>
+            <a:pPr marL="171450" indent="-171450">
+              <a:buFont typeface="Arial" panose="020B0604020202020204" pitchFamily="34" charset="0"/>
+              <a:buChar char="•"/>
+            </a:pPr>
+            <a:endParaRPr lang="en-US" sz="600" dirty="0">
+              <a:latin typeface="Trebuchet MS" panose="020B0703020202090204" pitchFamily="34" charset="0"/>
+            </a:endParaRPr>
+          </a:p>
+          <a:p>
+            <a:r>
+              <a:rPr lang="en-US" sz="600" u="sng" dirty="0">
+                <a:latin typeface="Trebuchet MS" panose="020B0703020202090204" pitchFamily="34" charset="0"/>
+              </a:rPr>
+              <a:t>Grades Module</a:t>
+            </a:r>
+          </a:p>
+          <a:p>
+            <a:pPr marL="171450" indent="-171450">
+              <a:buFont typeface="Arial" panose="020B0604020202020204" pitchFamily="34" charset="0"/>
+              <a:buChar char="•"/>
+            </a:pPr>
+            <a:r>
+              <a:rPr lang="en-US" sz="600" dirty="0">
+                <a:latin typeface="Trebuchet MS" panose="020B0703020202090204" pitchFamily="34" charset="0"/>
+              </a:rPr>
+              <a:t>Grades Modification</a:t>
+            </a:r>
+          </a:p>
+          <a:p>
+            <a:pPr marL="171450" indent="-171450">
+              <a:buFont typeface="Arial" panose="020B0604020202020204" pitchFamily="34" charset="0"/>
+              <a:buChar char="•"/>
+            </a:pPr>
+            <a:r>
+              <a:rPr lang="en-US" sz="600" dirty="0">
+                <a:latin typeface="Trebuchet MS" panose="020B0703020202090204" pitchFamily="34" charset="0"/>
+              </a:rPr>
+              <a:t>Adding of Grades</a:t>
+            </a:r>
+          </a:p>
+          <a:p>
+            <a:pPr marL="171450" indent="-171450">
+              <a:buFont typeface="Arial" panose="020B0604020202020204" pitchFamily="34" charset="0"/>
+              <a:buChar char="•"/>
+            </a:pPr>
+            <a:r>
+              <a:rPr lang="en-US" sz="600" dirty="0">
+                <a:latin typeface="Trebuchet MS" panose="020B0703020202090204" pitchFamily="34" charset="0"/>
+              </a:rPr>
+              <a:t>Grades Viewing</a:t>
+            </a:r>
+          </a:p>
+          <a:p>
+            <a:pPr marL="171450" indent="-171450">
+              <a:buFont typeface="Arial" panose="020B0604020202020204" pitchFamily="34" charset="0"/>
+              <a:buChar char="•"/>
+            </a:pPr>
+            <a:endParaRPr lang="en-US" sz="600" dirty="0">
+              <a:latin typeface="Trebuchet MS" panose="020B0703020202090204" pitchFamily="34" charset="0"/>
+            </a:endParaRPr>
+          </a:p>
+          <a:p>
+            <a:r>
+              <a:rPr lang="en-US" sz="600" u="sng" dirty="0">
+                <a:latin typeface="Trebuchet MS" panose="020B0703020202090204" pitchFamily="34" charset="0"/>
+              </a:rPr>
+              <a:t>Rewards Module</a:t>
+            </a:r>
+          </a:p>
+          <a:p>
+            <a:pPr marL="171450" indent="-171450">
+              <a:buFont typeface="Arial" panose="020B0604020202020204" pitchFamily="34" charset="0"/>
+              <a:buChar char="•"/>
+            </a:pPr>
+            <a:r>
+              <a:rPr lang="en-US" sz="600" dirty="0">
+                <a:latin typeface="Trebuchet MS" panose="020B0703020202090204" pitchFamily="34" charset="0"/>
+              </a:rPr>
+              <a:t>Creation of reward points</a:t>
+            </a:r>
+          </a:p>
+          <a:p>
+            <a:pPr marL="171450" indent="-171450">
+              <a:buFont typeface="Arial" panose="020B0604020202020204" pitchFamily="34" charset="0"/>
+              <a:buChar char="•"/>
+            </a:pPr>
+            <a:r>
+              <a:rPr lang="en-US" sz="600" dirty="0">
+                <a:latin typeface="Trebuchet MS" panose="020B0703020202090204" pitchFamily="34" charset="0"/>
+              </a:rPr>
+              <a:t>Updating of reward points</a:t>
+            </a:r>
+          </a:p>
+          <a:p>
+            <a:pPr marL="171450" indent="-171450">
+              <a:buFont typeface="Arial" panose="020B0604020202020204" pitchFamily="34" charset="0"/>
+              <a:buChar char="•"/>
+            </a:pPr>
+            <a:r>
+              <a:rPr lang="en-US" sz="600" dirty="0">
+                <a:latin typeface="Trebuchet MS" panose="020B0703020202090204" pitchFamily="34" charset="0"/>
+              </a:rPr>
+              <a:t>Reading of reward points</a:t>
+            </a:r>
+          </a:p>
+          <a:p>
+            <a:endParaRPr lang="en-US" sz="600" dirty="0">
+              <a:latin typeface="Trebuchet MS" panose="020B0703020202090204" pitchFamily="34" charset="0"/>
+            </a:endParaRPr>
+          </a:p>
+          <a:p>
+            <a:endParaRPr lang="en-US" sz="600" dirty="0">
+              <a:latin typeface="Trebuchet MS" panose="020B0703020202090204" pitchFamily="34" charset="0"/>
+            </a:endParaRPr>
           </a:p>
           <a:p>
             <a:endParaRPr lang="en-US" sz="600" dirty="0">
@@ -15790,7 +15906,7 @@
         <p:spPr>
           <a:xfrm>
             <a:off x="2159427" y="1318034"/>
-            <a:ext cx="1317399" cy="2769989"/>
+            <a:ext cx="1317399" cy="1292662"/>
           </a:xfrm>
           <a:prstGeom prst="rect">
             <a:avLst/>
@@ -15868,7 +15984,7 @@
               <a:rPr lang="en-US" sz="600" u="sng" dirty="0">
                 <a:latin typeface="Trebuchet MS" panose="020B0703020202090204" pitchFamily="34" charset="0"/>
               </a:rPr>
-              <a:t>Grades Module</a:t>
+              <a:t>Attendance Module</a:t>
             </a:r>
           </a:p>
           <a:p>
@@ -15880,7 +15996,7 @@
               <a:rPr lang="en-US" sz="600" dirty="0">
                 <a:latin typeface="Trebuchet MS" panose="020B0703020202090204" pitchFamily="34" charset="0"/>
               </a:rPr>
-              <a:t>Grades Modification</a:t>
+              <a:t>Creation of Tutor &amp; Student Attendance</a:t>
             </a:r>
           </a:p>
           <a:p>
@@ -15892,7 +16008,7 @@
               <a:rPr lang="en-US" sz="600" dirty="0">
                 <a:latin typeface="Trebuchet MS" panose="020B0703020202090204" pitchFamily="34" charset="0"/>
               </a:rPr>
-              <a:t>Adding of Grades</a:t>
+              <a:t>Reading of Tutor &amp; Student Attendance</a:t>
             </a:r>
           </a:p>
           <a:p>
@@ -15904,166 +16020,7 @@
               <a:rPr lang="en-US" sz="600" dirty="0">
                 <a:latin typeface="Trebuchet MS" panose="020B0703020202090204" pitchFamily="34" charset="0"/>
               </a:rPr>
-              <a:t>Grades Viewing</a:t>
-            </a:r>
-          </a:p>
-          <a:p>
-            <a:endParaRPr lang="en-US" sz="600" dirty="0">
-              <a:latin typeface="Trebuchet MS" panose="020B0703020202090204" pitchFamily="34" charset="0"/>
-            </a:endParaRPr>
-          </a:p>
-          <a:p>
-            <a:r>
-              <a:rPr lang="en-US" sz="600" u="sng" dirty="0">
-                <a:latin typeface="Trebuchet MS" panose="020B0703020202090204" pitchFamily="34" charset="0"/>
-              </a:rPr>
-              <a:t>Attendance Module</a:t>
-            </a:r>
-          </a:p>
-          <a:p>
-            <a:pPr marL="171450" indent="-171450">
-              <a:buFont typeface="Arial" panose="020B0604020202020204" pitchFamily="34" charset="0"/>
-              <a:buChar char="•"/>
-            </a:pPr>
-            <a:r>
-              <a:rPr lang="en-US" sz="600" dirty="0">
-                <a:latin typeface="Trebuchet MS" panose="020B0703020202090204" pitchFamily="34" charset="0"/>
-              </a:rPr>
-              <a:t>Creation of Tutor &amp; Student Attendance</a:t>
-            </a:r>
-          </a:p>
-          <a:p>
-            <a:pPr marL="171450" indent="-171450">
-              <a:buFont typeface="Arial" panose="020B0604020202020204" pitchFamily="34" charset="0"/>
-              <a:buChar char="•"/>
-            </a:pPr>
-            <a:r>
-              <a:rPr lang="en-US" sz="600" dirty="0">
-                <a:latin typeface="Trebuchet MS" panose="020B0703020202090204" pitchFamily="34" charset="0"/>
-              </a:rPr>
-              <a:t>Reading of Tutor &amp; Student Attendance</a:t>
-            </a:r>
-          </a:p>
-          <a:p>
-            <a:pPr marL="171450" indent="-171450">
-              <a:buFont typeface="Arial" panose="020B0604020202020204" pitchFamily="34" charset="0"/>
-              <a:buChar char="•"/>
-            </a:pPr>
-            <a:r>
-              <a:rPr lang="en-US" sz="600" dirty="0">
-                <a:latin typeface="Trebuchet MS" panose="020B0703020202090204" pitchFamily="34" charset="0"/>
-              </a:rPr>
               <a:t>Updating of Tutor &amp; Student Attendance</a:t>
-            </a:r>
-          </a:p>
-          <a:p>
-            <a:endParaRPr lang="en-US" sz="600" dirty="0">
-              <a:latin typeface="Trebuchet MS" panose="020B0703020202090204" pitchFamily="34" charset="0"/>
-            </a:endParaRPr>
-          </a:p>
-          <a:p>
-            <a:r>
-              <a:rPr lang="en-US" sz="600" u="sng" dirty="0">
-                <a:latin typeface="Trebuchet MS" panose="020B0703020202090204" pitchFamily="34" charset="0"/>
-              </a:rPr>
-              <a:t>Rewards Module</a:t>
-            </a:r>
-          </a:p>
-          <a:p>
-            <a:pPr marL="171450" indent="-171450">
-              <a:buFont typeface="Arial" panose="020B0604020202020204" pitchFamily="34" charset="0"/>
-              <a:buChar char="•"/>
-            </a:pPr>
-            <a:r>
-              <a:rPr lang="en-US" sz="600" dirty="0">
-                <a:latin typeface="Trebuchet MS" panose="020B0703020202090204" pitchFamily="34" charset="0"/>
-              </a:rPr>
-              <a:t>Creation of reward points</a:t>
-            </a:r>
-          </a:p>
-          <a:p>
-            <a:pPr marL="171450" indent="-171450">
-              <a:buFont typeface="Arial" panose="020B0604020202020204" pitchFamily="34" charset="0"/>
-              <a:buChar char="•"/>
-            </a:pPr>
-            <a:r>
-              <a:rPr lang="en-US" sz="600" dirty="0">
-                <a:latin typeface="Trebuchet MS" panose="020B0703020202090204" pitchFamily="34" charset="0"/>
-              </a:rPr>
-              <a:t>Updating of reward points</a:t>
-            </a:r>
-          </a:p>
-          <a:p>
-            <a:pPr marL="171450" indent="-171450">
-              <a:buFont typeface="Arial" panose="020B0604020202020204" pitchFamily="34" charset="0"/>
-              <a:buChar char="•"/>
-            </a:pPr>
-            <a:r>
-              <a:rPr lang="en-US" sz="600" dirty="0">
-                <a:latin typeface="Trebuchet MS" panose="020B0703020202090204" pitchFamily="34" charset="0"/>
-              </a:rPr>
-              <a:t>Reading of reward points</a:t>
-            </a:r>
-          </a:p>
-          <a:p>
-            <a:endParaRPr lang="en-US" sz="600" dirty="0">
-              <a:latin typeface="Trebuchet MS" panose="020B0703020202090204" pitchFamily="34" charset="0"/>
-            </a:endParaRPr>
-          </a:p>
-          <a:p>
-            <a:r>
-              <a:rPr lang="en-US" sz="600" u="sng" dirty="0">
-                <a:latin typeface="Trebuchet MS" panose="020B0703020202090204" pitchFamily="34" charset="0"/>
-              </a:rPr>
-              <a:t>Grades Tracking</a:t>
-            </a:r>
-          </a:p>
-          <a:p>
-            <a:pPr marL="171450" indent="-171450">
-              <a:buFont typeface="Arial" panose="020B0604020202020204" pitchFamily="34" charset="0"/>
-              <a:buChar char="•"/>
-            </a:pPr>
-            <a:r>
-              <a:rPr lang="en-US" sz="600" dirty="0">
-                <a:latin typeface="Trebuchet MS" panose="020B0703020202090204" pitchFamily="34" charset="0"/>
-              </a:rPr>
-              <a:t>Creating Grades</a:t>
-            </a:r>
-          </a:p>
-          <a:p>
-            <a:pPr marL="171450" indent="-171450">
-              <a:buFont typeface="Arial" panose="020B0604020202020204" pitchFamily="34" charset="0"/>
-              <a:buChar char="•"/>
-            </a:pPr>
-            <a:r>
-              <a:rPr lang="en-US" sz="600" dirty="0">
-                <a:latin typeface="Trebuchet MS" panose="020B0703020202090204" pitchFamily="34" charset="0"/>
-              </a:rPr>
-              <a:t>Updating Grades</a:t>
-            </a:r>
-          </a:p>
-          <a:p>
-            <a:pPr marL="171450" indent="-171450">
-              <a:buFont typeface="Arial" panose="020B0604020202020204" pitchFamily="34" charset="0"/>
-              <a:buChar char="•"/>
-            </a:pPr>
-            <a:r>
-              <a:rPr lang="en-US" sz="600" dirty="0">
-                <a:latin typeface="Trebuchet MS" panose="020B0703020202090204" pitchFamily="34" charset="0"/>
-              </a:rPr>
-              <a:t>Deleting Grades</a:t>
-            </a:r>
-          </a:p>
-          <a:p>
-            <a:pPr marL="171450" indent="-171450">
-              <a:buFont typeface="Arial" panose="020B0604020202020204" pitchFamily="34" charset="0"/>
-              <a:buChar char="•"/>
-            </a:pPr>
-            <a:r>
-              <a:rPr lang="en-US" sz="600" dirty="0">
-                <a:latin typeface="Trebuchet MS" panose="020B0703020202090204" pitchFamily="34" charset="0"/>
-              </a:rPr>
-              <a:t>Reading Grades</a:t>
             </a:r>
           </a:p>
         </p:txBody>

</xml_diff>

<commit_message>
navi bar for payment handling
</commit_message>
<xml_diff>
--- a/wiki/Wiki Template.pptx
+++ b/wiki/Wiki Template.pptx
@@ -253,7 +253,7 @@
           <a:p>
             <a:fld id="{A5C1DC53-9CC5-458A-B04C-4467225BFBE6}" type="datetimeFigureOut">
               <a:rPr lang="en-US" smtClean="0"/>
-              <a:t>9/3/2018</a:t>
+              <a:t>9/17/2018</a:t>
             </a:fld>
             <a:endParaRPr lang="en-US"/>
           </a:p>
@@ -423,7 +423,7 @@
           <a:p>
             <a:fld id="{A5C1DC53-9CC5-458A-B04C-4467225BFBE6}" type="datetimeFigureOut">
               <a:rPr lang="en-US" smtClean="0"/>
-              <a:t>9/3/2018</a:t>
+              <a:t>9/17/2018</a:t>
             </a:fld>
             <a:endParaRPr lang="en-US"/>
           </a:p>
@@ -603,7 +603,7 @@
           <a:p>
             <a:fld id="{A5C1DC53-9CC5-458A-B04C-4467225BFBE6}" type="datetimeFigureOut">
               <a:rPr lang="en-US" smtClean="0"/>
-              <a:t>9/3/2018</a:t>
+              <a:t>9/17/2018</a:t>
             </a:fld>
             <a:endParaRPr lang="en-US"/>
           </a:p>
@@ -773,7 +773,7 @@
           <a:p>
             <a:fld id="{A5C1DC53-9CC5-458A-B04C-4467225BFBE6}" type="datetimeFigureOut">
               <a:rPr lang="en-US" smtClean="0"/>
-              <a:t>9/3/2018</a:t>
+              <a:t>9/17/2018</a:t>
             </a:fld>
             <a:endParaRPr lang="en-US"/>
           </a:p>
@@ -1017,7 +1017,7 @@
           <a:p>
             <a:fld id="{A5C1DC53-9CC5-458A-B04C-4467225BFBE6}" type="datetimeFigureOut">
               <a:rPr lang="en-US" smtClean="0"/>
-              <a:t>9/3/2018</a:t>
+              <a:t>9/17/2018</a:t>
             </a:fld>
             <a:endParaRPr lang="en-US"/>
           </a:p>
@@ -1249,7 +1249,7 @@
           <a:p>
             <a:fld id="{A5C1DC53-9CC5-458A-B04C-4467225BFBE6}" type="datetimeFigureOut">
               <a:rPr lang="en-US" smtClean="0"/>
-              <a:t>9/3/2018</a:t>
+              <a:t>9/17/2018</a:t>
             </a:fld>
             <a:endParaRPr lang="en-US"/>
           </a:p>
@@ -1616,7 +1616,7 @@
           <a:p>
             <a:fld id="{A5C1DC53-9CC5-458A-B04C-4467225BFBE6}" type="datetimeFigureOut">
               <a:rPr lang="en-US" smtClean="0"/>
-              <a:t>9/3/2018</a:t>
+              <a:t>9/17/2018</a:t>
             </a:fld>
             <a:endParaRPr lang="en-US"/>
           </a:p>
@@ -1734,7 +1734,7 @@
           <a:p>
             <a:fld id="{A5C1DC53-9CC5-458A-B04C-4467225BFBE6}" type="datetimeFigureOut">
               <a:rPr lang="en-US" smtClean="0"/>
-              <a:t>9/3/2018</a:t>
+              <a:t>9/17/2018</a:t>
             </a:fld>
             <a:endParaRPr lang="en-US"/>
           </a:p>
@@ -1829,7 +1829,7 @@
           <a:p>
             <a:fld id="{A5C1DC53-9CC5-458A-B04C-4467225BFBE6}" type="datetimeFigureOut">
               <a:rPr lang="en-US" smtClean="0"/>
-              <a:t>9/3/2018</a:t>
+              <a:t>9/17/2018</a:t>
             </a:fld>
             <a:endParaRPr lang="en-US"/>
           </a:p>
@@ -2106,7 +2106,7 @@
           <a:p>
             <a:fld id="{A5C1DC53-9CC5-458A-B04C-4467225BFBE6}" type="datetimeFigureOut">
               <a:rPr lang="en-US" smtClean="0"/>
-              <a:t>9/3/2018</a:t>
+              <a:t>9/17/2018</a:t>
             </a:fld>
             <a:endParaRPr lang="en-US"/>
           </a:p>
@@ -2363,7 +2363,7 @@
           <a:p>
             <a:fld id="{A5C1DC53-9CC5-458A-B04C-4467225BFBE6}" type="datetimeFigureOut">
               <a:rPr lang="en-US" smtClean="0"/>
-              <a:t>9/3/2018</a:t>
+              <a:t>9/17/2018</a:t>
             </a:fld>
             <a:endParaRPr lang="en-US"/>
           </a:p>
@@ -2576,7 +2576,7 @@
           <a:p>
             <a:fld id="{A5C1DC53-9CC5-458A-B04C-4467225BFBE6}" type="datetimeFigureOut">
               <a:rPr lang="en-US" smtClean="0"/>
-              <a:t>9/3/2018</a:t>
+              <a:t>9/17/2018</a:t>
             </a:fld>
             <a:endParaRPr lang="en-US"/>
           </a:p>
@@ -10714,7 +10714,7 @@
                 </a:solidFill>
                 <a:latin typeface="Trebuchet MS" panose="020B0703020202090204" pitchFamily="34" charset="0"/>
               </a:rPr>
-              <a:t>6</a:t>
+              <a:t>7</a:t>
             </a:r>
           </a:p>
         </p:txBody>
@@ -10800,7 +10800,7 @@
                 </a:solidFill>
                 <a:latin typeface="Trebuchet MS" panose="020B0703020202090204" pitchFamily="34" charset="0"/>
               </a:rPr>
-              <a:t>2 Sep 2018 </a:t>
+              <a:t>17 Sep 2018 </a:t>
             </a:r>
           </a:p>
           <a:p>
@@ -10814,7 +10814,7 @@
                 </a:solidFill>
                 <a:latin typeface="Trebuchet MS" panose="020B0703020202090204" pitchFamily="34" charset="0"/>
               </a:rPr>
-              <a:t>   –  16 Sep 2018</a:t>
+              <a:t>   –  30 Sep 2018</a:t>
             </a:r>
           </a:p>
         </p:txBody>
@@ -12560,7 +12560,7 @@
                 </a:solidFill>
                 <a:latin typeface="Trebuchet MS" panose="020B0703020202090204" pitchFamily="34" charset="0"/>
               </a:rPr>
-              <a:t>7 Sep 2018, Fri</a:t>
+              <a:t>21 Sep 2018, Fri</a:t>
             </a:r>
           </a:p>
         </p:txBody>
@@ -12603,7 +12603,7 @@
                 </a:solidFill>
                 <a:latin typeface="Trebuchet MS" panose="020B0703020202090204" pitchFamily="34" charset="0"/>
               </a:rPr>
-              <a:t>8 Sep 2018, Fri</a:t>
+              <a:t>22 Sep 2018, Sat</a:t>
             </a:r>
           </a:p>
         </p:txBody>
@@ -12646,7 +12646,7 @@
                 </a:solidFill>
                 <a:latin typeface="Trebuchet MS" panose="020B0703020202090204" pitchFamily="34" charset="0"/>
               </a:rPr>
-              <a:t>7 Sep 2018, Fri</a:t>
+              <a:t>21 Sep 2018, Fri</a:t>
             </a:r>
           </a:p>
         </p:txBody>

</xml_diff>